<commit_message>
dabbling in 1 and (new) 4; still not done
</commit_message>
<xml_diff>
--- a/figures/allfigures.pptx
+++ b/figures/allfigures.pptx
@@ -8,6 +8,7 @@
     <p:sldId id="256" r:id="rId2"/>
     <p:sldId id="257" r:id="rId3"/>
     <p:sldId id="258" r:id="rId4"/>
+    <p:sldId id="260" r:id="rId5"/>
   </p:sldIdLst>
   <p:sldSz cx="9144000" cy="6858000" type="screen4x3"/>
   <p:notesSz cx="6858000" cy="9144000"/>
@@ -106,6 +107,22 @@
       </a:defRPr>
     </a:lvl9pPr>
   </p:defaultTextStyle>
+  <p:extLst>
+    <p:ext uri="{EFAFB233-063F-42B5-8137-9DF3F51BA10A}">
+      <p15:sldGuideLst xmlns:p15="http://schemas.microsoft.com/office/powerpoint/2012/main">
+        <p15:guide id="1" orient="horz" pos="2160">
+          <p15:clr>
+            <a:srgbClr val="A4A3A4"/>
+          </p15:clr>
+        </p15:guide>
+        <p15:guide id="2" pos="2880">
+          <p15:clr>
+            <a:srgbClr val="A4A3A4"/>
+          </p15:clr>
+        </p15:guide>
+      </p15:sldGuideLst>
+    </p:ext>
+  </p:extLst>
 </p:presentation>
 </file>
 
@@ -291,7 +308,7 @@
             <a:fld id="{1D8BD707-D9CF-40AE-B4C6-C98DA3205C09}" type="datetimeFigureOut">
               <a:rPr lang="en-US" smtClean="0"/>
               <a:pPr/>
-              <a:t>6/27/2013</a:t>
+              <a:t>7/2/2013</a:t>
             </a:fld>
             <a:endParaRPr lang="en-US"/>
           </a:p>
@@ -458,7 +475,7 @@
             <a:fld id="{1D8BD707-D9CF-40AE-B4C6-C98DA3205C09}" type="datetimeFigureOut">
               <a:rPr lang="en-US" smtClean="0"/>
               <a:pPr/>
-              <a:t>6/27/2013</a:t>
+              <a:t>7/2/2013</a:t>
             </a:fld>
             <a:endParaRPr lang="en-US"/>
           </a:p>
@@ -635,7 +652,7 @@
             <a:fld id="{1D8BD707-D9CF-40AE-B4C6-C98DA3205C09}" type="datetimeFigureOut">
               <a:rPr lang="en-US" smtClean="0"/>
               <a:pPr/>
-              <a:t>6/27/2013</a:t>
+              <a:t>7/2/2013</a:t>
             </a:fld>
             <a:endParaRPr lang="en-US"/>
           </a:p>
@@ -802,7 +819,7 @@
             <a:fld id="{1D8BD707-D9CF-40AE-B4C6-C98DA3205C09}" type="datetimeFigureOut">
               <a:rPr lang="en-US" smtClean="0"/>
               <a:pPr/>
-              <a:t>6/27/2013</a:t>
+              <a:t>7/2/2013</a:t>
             </a:fld>
             <a:endParaRPr lang="en-US"/>
           </a:p>
@@ -1045,7 +1062,7 @@
             <a:fld id="{1D8BD707-D9CF-40AE-B4C6-C98DA3205C09}" type="datetimeFigureOut">
               <a:rPr lang="en-US" smtClean="0"/>
               <a:pPr/>
-              <a:t>6/27/2013</a:t>
+              <a:t>7/2/2013</a:t>
             </a:fld>
             <a:endParaRPr lang="en-US"/>
           </a:p>
@@ -1330,7 +1347,7 @@
             <a:fld id="{1D8BD707-D9CF-40AE-B4C6-C98DA3205C09}" type="datetimeFigureOut">
               <a:rPr lang="en-US" smtClean="0"/>
               <a:pPr/>
-              <a:t>6/27/2013</a:t>
+              <a:t>7/2/2013</a:t>
             </a:fld>
             <a:endParaRPr lang="en-US"/>
           </a:p>
@@ -1749,7 +1766,7 @@
             <a:fld id="{1D8BD707-D9CF-40AE-B4C6-C98DA3205C09}" type="datetimeFigureOut">
               <a:rPr lang="en-US" smtClean="0"/>
               <a:pPr/>
-              <a:t>6/27/2013</a:t>
+              <a:t>7/2/2013</a:t>
             </a:fld>
             <a:endParaRPr lang="en-US"/>
           </a:p>
@@ -1864,7 +1881,7 @@
             <a:fld id="{1D8BD707-D9CF-40AE-B4C6-C98DA3205C09}" type="datetimeFigureOut">
               <a:rPr lang="en-US" smtClean="0"/>
               <a:pPr/>
-              <a:t>6/27/2013</a:t>
+              <a:t>7/2/2013</a:t>
             </a:fld>
             <a:endParaRPr lang="en-US"/>
           </a:p>
@@ -1956,7 +1973,7 @@
             <a:fld id="{1D8BD707-D9CF-40AE-B4C6-C98DA3205C09}" type="datetimeFigureOut">
               <a:rPr lang="en-US" smtClean="0"/>
               <a:pPr/>
-              <a:t>6/27/2013</a:t>
+              <a:t>7/2/2013</a:t>
             </a:fld>
             <a:endParaRPr lang="en-US"/>
           </a:p>
@@ -2230,7 +2247,7 @@
             <a:fld id="{1D8BD707-D9CF-40AE-B4C6-C98DA3205C09}" type="datetimeFigureOut">
               <a:rPr lang="en-US" smtClean="0"/>
               <a:pPr/>
-              <a:t>6/27/2013</a:t>
+              <a:t>7/2/2013</a:t>
             </a:fld>
             <a:endParaRPr lang="en-US"/>
           </a:p>
@@ -2480,7 +2497,7 @@
             <a:fld id="{1D8BD707-D9CF-40AE-B4C6-C98DA3205C09}" type="datetimeFigureOut">
               <a:rPr lang="en-US" smtClean="0"/>
               <a:pPr/>
-              <a:t>6/27/2013</a:t>
+              <a:t>7/2/2013</a:t>
             </a:fld>
             <a:endParaRPr lang="en-US"/>
           </a:p>
@@ -2690,7 +2707,7 @@
             <a:fld id="{1D8BD707-D9CF-40AE-B4C6-C98DA3205C09}" type="datetimeFigureOut">
               <a:rPr lang="en-US" smtClean="0"/>
               <a:pPr/>
-              <a:t>6/27/2013</a:t>
+              <a:t>7/2/2013</a:t>
             </a:fld>
             <a:endParaRPr lang="en-US"/>
           </a:p>
@@ -6316,6 +6333,563 @@
     <p:extLst>
       <p:ext uri="{BB962C8B-B14F-4D97-AF65-F5344CB8AC3E}">
         <p14:creationId xmlns:p14="http://schemas.microsoft.com/office/powerpoint/2010/main" val="369328447"/>
+      </p:ext>
+    </p:extLst>
+  </p:cSld>
+  <p:clrMapOvr>
+    <a:masterClrMapping/>
+  </p:clrMapOvr>
+</p:sld>
+</file>
+
+<file path=ppt/slides/slide4.xml><?xml version="1.0" encoding="utf-8"?>
+<p:sld xmlns:a="http://schemas.openxmlformats.org/drawingml/2006/main" xmlns:r="http://schemas.openxmlformats.org/officeDocument/2006/relationships" xmlns:p="http://schemas.openxmlformats.org/presentationml/2006/main">
+  <p:cSld>
+    <p:spTree>
+      <p:nvGrpSpPr>
+        <p:cNvPr id="1" name=""/>
+        <p:cNvGrpSpPr/>
+        <p:nvPr/>
+      </p:nvGrpSpPr>
+      <p:grpSpPr>
+        <a:xfrm>
+          <a:off x="0" y="0"/>
+          <a:ext cx="0" cy="0"/>
+          <a:chOff x="0" y="0"/>
+          <a:chExt cx="0" cy="0"/>
+        </a:xfrm>
+      </p:grpSpPr>
+      <p:sp>
+        <p:nvSpPr>
+          <p:cNvPr id="2" name="Rectangle 1"/>
+          <p:cNvSpPr/>
+          <p:nvPr/>
+        </p:nvSpPr>
+        <p:spPr>
+          <a:xfrm>
+            <a:off x="1600200" y="2286000"/>
+            <a:ext cx="1371600" cy="609600"/>
+          </a:xfrm>
+          <a:prstGeom prst="rect">
+            <a:avLst/>
+          </a:prstGeom>
+          <a:noFill/>
+          <a:ln>
+            <a:solidFill>
+              <a:schemeClr val="tx1"/>
+            </a:solidFill>
+          </a:ln>
+        </p:spPr>
+        <p:style>
+          <a:lnRef idx="2">
+            <a:schemeClr val="accent1">
+              <a:shade val="50000"/>
+            </a:schemeClr>
+          </a:lnRef>
+          <a:fillRef idx="1">
+            <a:schemeClr val="accent1"/>
+          </a:fillRef>
+          <a:effectRef idx="0">
+            <a:schemeClr val="accent1"/>
+          </a:effectRef>
+          <a:fontRef idx="minor">
+            <a:schemeClr val="lt1"/>
+          </a:fontRef>
+        </p:style>
+        <p:txBody>
+          <a:bodyPr rtlCol="0" anchor="ctr"/>
+          <a:lstStyle/>
+          <a:p>
+            <a:pPr algn="ctr"/>
+            <a:r>
+              <a:rPr lang="en-US" dirty="0">
+                <a:solidFill>
+                  <a:schemeClr val="tx1"/>
+                </a:solidFill>
+              </a:rPr>
+              <a:t>R</a:t>
+            </a:r>
+            <a:r>
+              <a:rPr lang="en-US" dirty="0" smtClean="0">
+                <a:solidFill>
+                  <a:schemeClr val="tx1"/>
+                </a:solidFill>
+              </a:rPr>
+              <a:t>ule generator</a:t>
+            </a:r>
+            <a:endParaRPr lang="en-US" dirty="0">
+              <a:solidFill>
+                <a:schemeClr val="tx1"/>
+              </a:solidFill>
+            </a:endParaRPr>
+          </a:p>
+        </p:txBody>
+      </p:sp>
+      <p:sp>
+        <p:nvSpPr>
+          <p:cNvPr id="5" name="Rectangle 4"/>
+          <p:cNvSpPr/>
+          <p:nvPr/>
+        </p:nvSpPr>
+        <p:spPr>
+          <a:xfrm>
+            <a:off x="3429000" y="2286000"/>
+            <a:ext cx="1524000" cy="609600"/>
+          </a:xfrm>
+          <a:prstGeom prst="rect">
+            <a:avLst/>
+          </a:prstGeom>
+          <a:noFill/>
+          <a:ln>
+            <a:solidFill>
+              <a:schemeClr val="tx1"/>
+            </a:solidFill>
+          </a:ln>
+        </p:spPr>
+        <p:style>
+          <a:lnRef idx="2">
+            <a:schemeClr val="accent1">
+              <a:shade val="50000"/>
+            </a:schemeClr>
+          </a:lnRef>
+          <a:fillRef idx="1">
+            <a:schemeClr val="accent1"/>
+          </a:fillRef>
+          <a:effectRef idx="0">
+            <a:schemeClr val="accent1"/>
+          </a:effectRef>
+          <a:fontRef idx="minor">
+            <a:schemeClr val="lt1"/>
+          </a:fontRef>
+        </p:style>
+        <p:txBody>
+          <a:bodyPr rtlCol="0" anchor="ctr"/>
+          <a:lstStyle/>
+          <a:p>
+            <a:pPr algn="ctr"/>
+            <a:r>
+              <a:rPr lang="en-US" dirty="0" smtClean="0">
+                <a:solidFill>
+                  <a:schemeClr val="tx1"/>
+                </a:solidFill>
+              </a:rPr>
+              <a:t>Update graph generator</a:t>
+            </a:r>
+            <a:endParaRPr lang="en-US" dirty="0">
+              <a:solidFill>
+                <a:schemeClr val="tx1"/>
+              </a:solidFill>
+            </a:endParaRPr>
+          </a:p>
+        </p:txBody>
+      </p:sp>
+      <p:cxnSp>
+        <p:nvCxnSpPr>
+          <p:cNvPr id="7" name="Straight Arrow Connector 6"/>
+          <p:cNvCxnSpPr>
+            <a:stCxn id="2" idx="3"/>
+            <a:endCxn id="5" idx="1"/>
+          </p:cNvCxnSpPr>
+          <p:nvPr/>
+        </p:nvCxnSpPr>
+        <p:spPr>
+          <a:xfrm>
+            <a:off x="2971800" y="2590800"/>
+            <a:ext cx="457200" cy="0"/>
+          </a:xfrm>
+          <a:prstGeom prst="straightConnector1">
+            <a:avLst/>
+          </a:prstGeom>
+          <a:ln w="38100">
+            <a:solidFill>
+              <a:schemeClr val="tx1"/>
+            </a:solidFill>
+            <a:tailEnd type="triangle"/>
+          </a:ln>
+        </p:spPr>
+        <p:style>
+          <a:lnRef idx="1">
+            <a:schemeClr val="accent1"/>
+          </a:lnRef>
+          <a:fillRef idx="0">
+            <a:schemeClr val="accent1"/>
+          </a:fillRef>
+          <a:effectRef idx="0">
+            <a:schemeClr val="accent1"/>
+          </a:effectRef>
+          <a:fontRef idx="minor">
+            <a:schemeClr val="tx1"/>
+          </a:fontRef>
+        </p:style>
+      </p:cxnSp>
+      <p:cxnSp>
+        <p:nvCxnSpPr>
+          <p:cNvPr id="9" name="Straight Arrow Connector 8"/>
+          <p:cNvCxnSpPr>
+            <a:stCxn id="5" idx="3"/>
+            <a:endCxn id="10" idx="1"/>
+          </p:cNvCxnSpPr>
+          <p:nvPr/>
+        </p:nvCxnSpPr>
+        <p:spPr>
+          <a:xfrm>
+            <a:off x="4953000" y="2590800"/>
+            <a:ext cx="457200" cy="0"/>
+          </a:xfrm>
+          <a:prstGeom prst="straightConnector1">
+            <a:avLst/>
+          </a:prstGeom>
+          <a:ln w="38100">
+            <a:solidFill>
+              <a:schemeClr val="tx1"/>
+            </a:solidFill>
+            <a:tailEnd type="triangle"/>
+          </a:ln>
+        </p:spPr>
+        <p:style>
+          <a:lnRef idx="1">
+            <a:schemeClr val="accent1"/>
+          </a:lnRef>
+          <a:fillRef idx="0">
+            <a:schemeClr val="accent1"/>
+          </a:fillRef>
+          <a:effectRef idx="0">
+            <a:schemeClr val="accent1"/>
+          </a:effectRef>
+          <a:fontRef idx="minor">
+            <a:schemeClr val="tx1"/>
+          </a:fontRef>
+        </p:style>
+      </p:cxnSp>
+      <p:sp>
+        <p:nvSpPr>
+          <p:cNvPr id="10" name="Rectangle 9"/>
+          <p:cNvSpPr/>
+          <p:nvPr/>
+        </p:nvSpPr>
+        <p:spPr>
+          <a:xfrm>
+            <a:off x="5410200" y="2286000"/>
+            <a:ext cx="1524000" cy="609600"/>
+          </a:xfrm>
+          <a:prstGeom prst="rect">
+            <a:avLst/>
+          </a:prstGeom>
+          <a:noFill/>
+          <a:ln>
+            <a:solidFill>
+              <a:schemeClr val="tx1"/>
+            </a:solidFill>
+          </a:ln>
+        </p:spPr>
+        <p:style>
+          <a:lnRef idx="2">
+            <a:schemeClr val="accent1">
+              <a:shade val="50000"/>
+            </a:schemeClr>
+          </a:lnRef>
+          <a:fillRef idx="1">
+            <a:schemeClr val="accent1"/>
+          </a:fillRef>
+          <a:effectRef idx="0">
+            <a:schemeClr val="accent1"/>
+          </a:effectRef>
+          <a:fontRef idx="minor">
+            <a:schemeClr val="lt1"/>
+          </a:fontRef>
+        </p:style>
+        <p:txBody>
+          <a:bodyPr rtlCol="0" anchor="ctr"/>
+          <a:lstStyle/>
+          <a:p>
+            <a:pPr algn="ctr"/>
+            <a:r>
+              <a:rPr lang="en-US" dirty="0" smtClean="0">
+                <a:solidFill>
+                  <a:schemeClr val="tx1"/>
+                </a:solidFill>
+              </a:rPr>
+              <a:t>Update graph applier</a:t>
+            </a:r>
+            <a:endParaRPr lang="en-US" dirty="0">
+              <a:solidFill>
+                <a:schemeClr val="tx1"/>
+              </a:solidFill>
+            </a:endParaRPr>
+          </a:p>
+        </p:txBody>
+      </p:sp>
+      <p:cxnSp>
+        <p:nvCxnSpPr>
+          <p:cNvPr id="14" name="Straight Arrow Connector 13"/>
+          <p:cNvCxnSpPr>
+            <a:stCxn id="35" idx="4"/>
+            <a:endCxn id="2" idx="0"/>
+          </p:cNvCxnSpPr>
+          <p:nvPr/>
+        </p:nvCxnSpPr>
+        <p:spPr>
+          <a:xfrm>
+            <a:off x="2247900" y="1981200"/>
+            <a:ext cx="38100" cy="304800"/>
+          </a:xfrm>
+          <a:prstGeom prst="straightConnector1">
+            <a:avLst/>
+          </a:prstGeom>
+          <a:ln w="38100">
+            <a:solidFill>
+              <a:schemeClr val="tx1"/>
+            </a:solidFill>
+            <a:tailEnd type="triangle"/>
+          </a:ln>
+        </p:spPr>
+        <p:style>
+          <a:lnRef idx="1">
+            <a:schemeClr val="accent1"/>
+          </a:lnRef>
+          <a:fillRef idx="0">
+            <a:schemeClr val="accent1"/>
+          </a:fillRef>
+          <a:effectRef idx="0">
+            <a:schemeClr val="accent1"/>
+          </a:effectRef>
+          <a:fontRef idx="minor">
+            <a:schemeClr val="tx1"/>
+          </a:fontRef>
+        </p:style>
+      </p:cxnSp>
+      <p:cxnSp>
+        <p:nvCxnSpPr>
+          <p:cNvPr id="16" name="Straight Arrow Connector 15"/>
+          <p:cNvCxnSpPr>
+            <a:stCxn id="37" idx="4"/>
+            <a:endCxn id="5" idx="0"/>
+          </p:cNvCxnSpPr>
+          <p:nvPr/>
+        </p:nvCxnSpPr>
+        <p:spPr>
+          <a:xfrm flipH="1">
+            <a:off x="4191000" y="1981200"/>
+            <a:ext cx="19050" cy="304800"/>
+          </a:xfrm>
+          <a:prstGeom prst="straightConnector1">
+            <a:avLst/>
+          </a:prstGeom>
+          <a:ln w="38100">
+            <a:solidFill>
+              <a:schemeClr val="tx1"/>
+            </a:solidFill>
+            <a:tailEnd type="triangle"/>
+          </a:ln>
+        </p:spPr>
+        <p:style>
+          <a:lnRef idx="1">
+            <a:schemeClr val="accent1"/>
+          </a:lnRef>
+          <a:fillRef idx="0">
+            <a:schemeClr val="accent1"/>
+          </a:fillRef>
+          <a:effectRef idx="0">
+            <a:schemeClr val="accent1"/>
+          </a:effectRef>
+          <a:fontRef idx="minor">
+            <a:schemeClr val="tx1"/>
+          </a:fontRef>
+        </p:style>
+      </p:cxnSp>
+      <p:cxnSp>
+        <p:nvCxnSpPr>
+          <p:cNvPr id="19" name="Straight Arrow Connector 18"/>
+          <p:cNvCxnSpPr>
+            <a:stCxn id="39" idx="4"/>
+            <a:endCxn id="10" idx="0"/>
+          </p:cNvCxnSpPr>
+          <p:nvPr/>
+        </p:nvCxnSpPr>
+        <p:spPr>
+          <a:xfrm flipH="1">
+            <a:off x="6172200" y="1981200"/>
+            <a:ext cx="38100" cy="304800"/>
+          </a:xfrm>
+          <a:prstGeom prst="straightConnector1">
+            <a:avLst/>
+          </a:prstGeom>
+          <a:ln w="38100">
+            <a:solidFill>
+              <a:schemeClr val="tx1"/>
+            </a:solidFill>
+            <a:tailEnd type="triangle"/>
+          </a:ln>
+        </p:spPr>
+        <p:style>
+          <a:lnRef idx="1">
+            <a:schemeClr val="accent1"/>
+          </a:lnRef>
+          <a:fillRef idx="0">
+            <a:schemeClr val="accent1"/>
+          </a:fillRef>
+          <a:effectRef idx="0">
+            <a:schemeClr val="accent1"/>
+          </a:effectRef>
+          <a:fontRef idx="minor">
+            <a:schemeClr val="tx1"/>
+          </a:fontRef>
+        </p:style>
+      </p:cxnSp>
+      <p:sp>
+        <p:nvSpPr>
+          <p:cNvPr id="35" name="Oval 34"/>
+          <p:cNvSpPr/>
+          <p:nvPr/>
+        </p:nvSpPr>
+        <p:spPr>
+          <a:xfrm>
+            <a:off x="1524000" y="1371600"/>
+            <a:ext cx="1447800" cy="609600"/>
+          </a:xfrm>
+          <a:prstGeom prst="ellipse">
+            <a:avLst/>
+          </a:prstGeom>
+          <a:solidFill>
+            <a:schemeClr val="tx1">
+              <a:lumMod val="50000"/>
+              <a:lumOff val="50000"/>
+            </a:schemeClr>
+          </a:solidFill>
+        </p:spPr>
+        <p:style>
+          <a:lnRef idx="2">
+            <a:schemeClr val="accent1">
+              <a:shade val="50000"/>
+            </a:schemeClr>
+          </a:lnRef>
+          <a:fillRef idx="1">
+            <a:schemeClr val="accent1"/>
+          </a:fillRef>
+          <a:effectRef idx="0">
+            <a:schemeClr val="accent1"/>
+          </a:effectRef>
+          <a:fontRef idx="minor">
+            <a:schemeClr val="lt1"/>
+          </a:fontRef>
+        </p:style>
+        <p:txBody>
+          <a:bodyPr rtlCol="0" anchor="ctr"/>
+          <a:lstStyle/>
+          <a:p>
+            <a:pPr algn="ctr"/>
+            <a:r>
+              <a:rPr lang="en-US" dirty="0" smtClean="0"/>
+              <a:t>Routing policy</a:t>
+            </a:r>
+            <a:endParaRPr lang="en-US" dirty="0"/>
+          </a:p>
+        </p:txBody>
+      </p:sp>
+      <p:sp>
+        <p:nvSpPr>
+          <p:cNvPr id="37" name="Oval 36"/>
+          <p:cNvSpPr/>
+          <p:nvPr/>
+        </p:nvSpPr>
+        <p:spPr>
+          <a:xfrm>
+            <a:off x="3276600" y="1371600"/>
+            <a:ext cx="1866900" cy="609600"/>
+          </a:xfrm>
+          <a:prstGeom prst="ellipse">
+            <a:avLst/>
+          </a:prstGeom>
+          <a:solidFill>
+            <a:schemeClr val="tx1">
+              <a:lumMod val="50000"/>
+              <a:lumOff val="50000"/>
+            </a:schemeClr>
+          </a:solidFill>
+        </p:spPr>
+        <p:style>
+          <a:lnRef idx="2">
+            <a:schemeClr val="accent1">
+              <a:shade val="50000"/>
+            </a:schemeClr>
+          </a:lnRef>
+          <a:fillRef idx="1">
+            <a:schemeClr val="accent1"/>
+          </a:fillRef>
+          <a:effectRef idx="0">
+            <a:schemeClr val="accent1"/>
+          </a:effectRef>
+          <a:fontRef idx="minor">
+            <a:schemeClr val="lt1"/>
+          </a:fontRef>
+        </p:style>
+        <p:txBody>
+          <a:bodyPr rtlCol="0" anchor="ctr"/>
+          <a:lstStyle/>
+          <a:p>
+            <a:pPr algn="ctr"/>
+            <a:r>
+              <a:rPr lang="en-US" dirty="0" smtClean="0"/>
+              <a:t>Consistency property</a:t>
+            </a:r>
+            <a:endParaRPr lang="en-US" dirty="0"/>
+          </a:p>
+        </p:txBody>
+      </p:sp>
+      <p:sp>
+        <p:nvSpPr>
+          <p:cNvPr id="39" name="Oval 38"/>
+          <p:cNvSpPr/>
+          <p:nvPr/>
+        </p:nvSpPr>
+        <p:spPr>
+          <a:xfrm>
+            <a:off x="5486400" y="1371600"/>
+            <a:ext cx="1447800" cy="609600"/>
+          </a:xfrm>
+          <a:prstGeom prst="ellipse">
+            <a:avLst/>
+          </a:prstGeom>
+          <a:solidFill>
+            <a:schemeClr val="tx1">
+              <a:lumMod val="50000"/>
+              <a:lumOff val="50000"/>
+            </a:schemeClr>
+          </a:solidFill>
+        </p:spPr>
+        <p:style>
+          <a:lnRef idx="2">
+            <a:schemeClr val="accent1">
+              <a:shade val="50000"/>
+            </a:schemeClr>
+          </a:lnRef>
+          <a:fillRef idx="1">
+            <a:schemeClr val="accent1"/>
+          </a:fillRef>
+          <a:effectRef idx="0">
+            <a:schemeClr val="accent1"/>
+          </a:effectRef>
+          <a:fontRef idx="minor">
+            <a:schemeClr val="lt1"/>
+          </a:fontRef>
+        </p:style>
+        <p:txBody>
+          <a:bodyPr rtlCol="0" anchor="ctr"/>
+          <a:lstStyle/>
+          <a:p>
+            <a:pPr algn="ctr"/>
+            <a:r>
+              <a:rPr lang="en-US" dirty="0" smtClean="0"/>
+              <a:t>Network model</a:t>
+            </a:r>
+            <a:endParaRPr lang="en-US" dirty="0"/>
+          </a:p>
+        </p:txBody>
+      </p:sp>
+    </p:spTree>
+    <p:extLst>
+      <p:ext uri="{BB962C8B-B14F-4D97-AF65-F5344CB8AC3E}">
+        <p14:creationId xmlns:p14="http://schemas.microsoft.com/office/powerpoint/2010/main" val="1540731110"/>
       </p:ext>
     </p:extLst>
   </p:cSld>

</xml_diff>

<commit_message>
more tinkering of section 4.
</commit_message>
<xml_diff>
--- a/figures/allfigures.pptx
+++ b/figures/allfigures.pptx
@@ -115,7 +115,7 @@
             <a:srgbClr val="A4A3A4"/>
           </p15:clr>
         </p15:guide>
-        <p15:guide id="2" pos="2880">
+        <p15:guide id="2" pos="2640" userDrawn="1">
           <p15:clr>
             <a:srgbClr val="A4A3A4"/>
           </p15:clr>
@@ -308,7 +308,7 @@
             <a:fld id="{1D8BD707-D9CF-40AE-B4C6-C98DA3205C09}" type="datetimeFigureOut">
               <a:rPr lang="en-US" smtClean="0"/>
               <a:pPr/>
-              <a:t>7/2/2013</a:t>
+              <a:t>7/3/2013</a:t>
             </a:fld>
             <a:endParaRPr lang="en-US"/>
           </a:p>
@@ -475,7 +475,7 @@
             <a:fld id="{1D8BD707-D9CF-40AE-B4C6-C98DA3205C09}" type="datetimeFigureOut">
               <a:rPr lang="en-US" smtClean="0"/>
               <a:pPr/>
-              <a:t>7/2/2013</a:t>
+              <a:t>7/3/2013</a:t>
             </a:fld>
             <a:endParaRPr lang="en-US"/>
           </a:p>
@@ -652,7 +652,7 @@
             <a:fld id="{1D8BD707-D9CF-40AE-B4C6-C98DA3205C09}" type="datetimeFigureOut">
               <a:rPr lang="en-US" smtClean="0"/>
               <a:pPr/>
-              <a:t>7/2/2013</a:t>
+              <a:t>7/3/2013</a:t>
             </a:fld>
             <a:endParaRPr lang="en-US"/>
           </a:p>
@@ -819,7 +819,7 @@
             <a:fld id="{1D8BD707-D9CF-40AE-B4C6-C98DA3205C09}" type="datetimeFigureOut">
               <a:rPr lang="en-US" smtClean="0"/>
               <a:pPr/>
-              <a:t>7/2/2013</a:t>
+              <a:t>7/3/2013</a:t>
             </a:fld>
             <a:endParaRPr lang="en-US"/>
           </a:p>
@@ -1062,7 +1062,7 @@
             <a:fld id="{1D8BD707-D9CF-40AE-B4C6-C98DA3205C09}" type="datetimeFigureOut">
               <a:rPr lang="en-US" smtClean="0"/>
               <a:pPr/>
-              <a:t>7/2/2013</a:t>
+              <a:t>7/3/2013</a:t>
             </a:fld>
             <a:endParaRPr lang="en-US"/>
           </a:p>
@@ -1347,7 +1347,7 @@
             <a:fld id="{1D8BD707-D9CF-40AE-B4C6-C98DA3205C09}" type="datetimeFigureOut">
               <a:rPr lang="en-US" smtClean="0"/>
               <a:pPr/>
-              <a:t>7/2/2013</a:t>
+              <a:t>7/3/2013</a:t>
             </a:fld>
             <a:endParaRPr lang="en-US"/>
           </a:p>
@@ -1766,7 +1766,7 @@
             <a:fld id="{1D8BD707-D9CF-40AE-B4C6-C98DA3205C09}" type="datetimeFigureOut">
               <a:rPr lang="en-US" smtClean="0"/>
               <a:pPr/>
-              <a:t>7/2/2013</a:t>
+              <a:t>7/3/2013</a:t>
             </a:fld>
             <a:endParaRPr lang="en-US"/>
           </a:p>
@@ -1881,7 +1881,7 @@
             <a:fld id="{1D8BD707-D9CF-40AE-B4C6-C98DA3205C09}" type="datetimeFigureOut">
               <a:rPr lang="en-US" smtClean="0"/>
               <a:pPr/>
-              <a:t>7/2/2013</a:t>
+              <a:t>7/3/2013</a:t>
             </a:fld>
             <a:endParaRPr lang="en-US"/>
           </a:p>
@@ -1973,7 +1973,7 @@
             <a:fld id="{1D8BD707-D9CF-40AE-B4C6-C98DA3205C09}" type="datetimeFigureOut">
               <a:rPr lang="en-US" smtClean="0"/>
               <a:pPr/>
-              <a:t>7/2/2013</a:t>
+              <a:t>7/3/2013</a:t>
             </a:fld>
             <a:endParaRPr lang="en-US"/>
           </a:p>
@@ -2247,7 +2247,7 @@
             <a:fld id="{1D8BD707-D9CF-40AE-B4C6-C98DA3205C09}" type="datetimeFigureOut">
               <a:rPr lang="en-US" smtClean="0"/>
               <a:pPr/>
-              <a:t>7/2/2013</a:t>
+              <a:t>7/3/2013</a:t>
             </a:fld>
             <a:endParaRPr lang="en-US"/>
           </a:p>
@@ -2497,7 +2497,7 @@
             <a:fld id="{1D8BD707-D9CF-40AE-B4C6-C98DA3205C09}" type="datetimeFigureOut">
               <a:rPr lang="en-US" smtClean="0"/>
               <a:pPr/>
-              <a:t>7/2/2013</a:t>
+              <a:t>7/3/2013</a:t>
             </a:fld>
             <a:endParaRPr lang="en-US"/>
           </a:p>
@@ -2707,7 +2707,7 @@
             <a:fld id="{1D8BD707-D9CF-40AE-B4C6-C98DA3205C09}" type="datetimeFigureOut">
               <a:rPr lang="en-US" smtClean="0"/>
               <a:pPr/>
-              <a:t>7/2/2013</a:t>
+              <a:t>7/3/2013</a:t>
             </a:fld>
             <a:endParaRPr lang="en-US"/>
           </a:p>
@@ -6367,7 +6367,7 @@
         </p:nvSpPr>
         <p:spPr>
           <a:xfrm>
-            <a:off x="1600200" y="2286000"/>
+            <a:off x="609600" y="2286000"/>
             <a:ext cx="1371600" cy="609600"/>
           </a:xfrm>
           <a:prstGeom prst="rect">
@@ -6473,7 +6473,15 @@
                   <a:schemeClr val="tx1"/>
                 </a:solidFill>
               </a:rPr>
-              <a:t>Update graph generator</a:t>
+              <a:t>Update </a:t>
+            </a:r>
+            <a:r>
+              <a:rPr lang="en-US" dirty="0" smtClean="0">
+                <a:solidFill>
+                  <a:schemeClr val="tx1"/>
+                </a:solidFill>
+              </a:rPr>
+              <a:t>plan generator</a:t>
             </a:r>
             <a:endParaRPr lang="en-US" dirty="0">
               <a:solidFill>
@@ -6488,14 +6496,14 @@
           <p:cNvPr id="7" name="Straight Arrow Connector 6"/>
           <p:cNvCxnSpPr>
             <a:stCxn id="2" idx="3"/>
-            <a:endCxn id="5" idx="1"/>
+            <a:endCxn id="13" idx="2"/>
           </p:cNvCxnSpPr>
           <p:nvPr/>
         </p:nvCxnSpPr>
         <p:spPr>
           <a:xfrm>
-            <a:off x="2971800" y="2590800"/>
-            <a:ext cx="457200" cy="0"/>
+            <a:off x="1981200" y="2590800"/>
+            <a:ext cx="247650" cy="0"/>
           </a:xfrm>
           <a:prstGeom prst="straightConnector1">
             <a:avLst/>
@@ -6527,14 +6535,14 @@
           <p:cNvPr id="9" name="Straight Arrow Connector 8"/>
           <p:cNvCxnSpPr>
             <a:stCxn id="5" idx="3"/>
-            <a:endCxn id="10" idx="1"/>
+            <a:endCxn id="15" idx="2"/>
           </p:cNvCxnSpPr>
           <p:nvPr/>
         </p:nvCxnSpPr>
         <p:spPr>
           <a:xfrm>
             <a:off x="4953000" y="2590800"/>
-            <a:ext cx="457200" cy="0"/>
+            <a:ext cx="248568" cy="0"/>
           </a:xfrm>
           <a:prstGeom prst="straightConnector1">
             <a:avLst/>
@@ -6569,7 +6577,7 @@
         </p:nvSpPr>
         <p:spPr>
           <a:xfrm>
-            <a:off x="5410200" y="2286000"/>
+            <a:off x="6705600" y="2286000"/>
             <a:ext cx="1524000" cy="609600"/>
           </a:xfrm>
           <a:prstGeom prst="rect">
@@ -6609,7 +6617,23 @@
                   <a:schemeClr val="tx1"/>
                 </a:solidFill>
               </a:rPr>
-              <a:t>Update graph applier</a:t>
+              <a:t>Plan optimizer</a:t>
+            </a:r>
+            <a:r>
+              <a:rPr lang="en-US" dirty="0">
+                <a:solidFill>
+                  <a:schemeClr val="tx1"/>
+                </a:solidFill>
+              </a:rPr>
+              <a:t> </a:t>
+            </a:r>
+            <a:r>
+              <a:rPr lang="en-US" dirty="0" smtClean="0">
+                <a:solidFill>
+                  <a:schemeClr val="tx1"/>
+                </a:solidFill>
+              </a:rPr>
+              <a:t>and  executor</a:t>
             </a:r>
             <a:endParaRPr lang="en-US" dirty="0">
               <a:solidFill>
@@ -6630,7 +6654,7 @@
         </p:nvCxnSpPr>
         <p:spPr>
           <a:xfrm>
-            <a:off x="2247900" y="1981200"/>
+            <a:off x="1257300" y="1981200"/>
             <a:ext cx="38100" cy="304800"/>
           </a:xfrm>
           <a:prstGeom prst="straightConnector1">
@@ -6668,8 +6692,8 @@
           <p:nvPr/>
         </p:nvCxnSpPr>
         <p:spPr>
-          <a:xfrm flipH="1">
-            <a:off x="4191000" y="1981200"/>
+          <a:xfrm>
+            <a:off x="4171950" y="1981200"/>
             <a:ext cx="19050" cy="304800"/>
           </a:xfrm>
           <a:prstGeom prst="straightConnector1">
@@ -6708,7 +6732,7 @@
         </p:nvCxnSpPr>
         <p:spPr>
           <a:xfrm flipH="1">
-            <a:off x="6172200" y="1981200"/>
+            <a:off x="7467600" y="1981200"/>
             <a:ext cx="38100" cy="304800"/>
           </a:xfrm>
           <a:prstGeom prst="straightConnector1">
@@ -6744,18 +6768,16 @@
         </p:nvSpPr>
         <p:spPr>
           <a:xfrm>
-            <a:off x="1524000" y="1371600"/>
+            <a:off x="533400" y="1371600"/>
             <a:ext cx="1447800" cy="609600"/>
           </a:xfrm>
           <a:prstGeom prst="ellipse">
             <a:avLst/>
           </a:prstGeom>
-          <a:solidFill>
-            <a:schemeClr val="tx1">
-              <a:lumMod val="50000"/>
-              <a:lumOff val="50000"/>
-            </a:schemeClr>
-          </a:solidFill>
+          <a:noFill/>
+          <a:ln>
+            <a:noFill/>
+          </a:ln>
         </p:spPr>
         <p:style>
           <a:lnRef idx="2">
@@ -6779,10 +6801,18 @@
           <a:p>
             <a:pPr algn="ctr"/>
             <a:r>
-              <a:rPr lang="en-US" dirty="0" smtClean="0"/>
+              <a:rPr lang="en-US" dirty="0" smtClean="0">
+                <a:solidFill>
+                  <a:schemeClr val="tx1"/>
+                </a:solidFill>
+              </a:rPr>
               <a:t>Routing policy</a:t>
             </a:r>
-            <a:endParaRPr lang="en-US" dirty="0"/>
+            <a:endParaRPr lang="en-US" dirty="0">
+              <a:solidFill>
+                <a:schemeClr val="tx1"/>
+              </a:solidFill>
+            </a:endParaRPr>
           </a:p>
         </p:txBody>
       </p:sp>
@@ -6794,18 +6824,16 @@
         </p:nvSpPr>
         <p:spPr>
           <a:xfrm>
-            <a:off x="3276600" y="1371600"/>
+            <a:off x="3238500" y="1371600"/>
             <a:ext cx="1866900" cy="609600"/>
           </a:xfrm>
           <a:prstGeom prst="ellipse">
             <a:avLst/>
           </a:prstGeom>
-          <a:solidFill>
-            <a:schemeClr val="tx1">
-              <a:lumMod val="50000"/>
-              <a:lumOff val="50000"/>
-            </a:schemeClr>
-          </a:solidFill>
+          <a:noFill/>
+          <a:ln>
+            <a:noFill/>
+          </a:ln>
         </p:spPr>
         <p:style>
           <a:lnRef idx="2">
@@ -6829,10 +6857,18 @@
           <a:p>
             <a:pPr algn="ctr"/>
             <a:r>
-              <a:rPr lang="en-US" dirty="0" smtClean="0"/>
+              <a:rPr lang="en-US" dirty="0" smtClean="0">
+                <a:solidFill>
+                  <a:schemeClr val="tx1"/>
+                </a:solidFill>
+              </a:rPr>
               <a:t>Consistency property</a:t>
             </a:r>
-            <a:endParaRPr lang="en-US" dirty="0"/>
+            <a:endParaRPr lang="en-US" dirty="0">
+              <a:solidFill>
+                <a:schemeClr val="tx1"/>
+              </a:solidFill>
+            </a:endParaRPr>
           </a:p>
         </p:txBody>
       </p:sp>
@@ -6844,18 +6880,16 @@
         </p:nvSpPr>
         <p:spPr>
           <a:xfrm>
-            <a:off x="5486400" y="1371600"/>
-            <a:ext cx="1447800" cy="609600"/>
+            <a:off x="6400800" y="1371600"/>
+            <a:ext cx="2209800" cy="609600"/>
           </a:xfrm>
           <a:prstGeom prst="ellipse">
             <a:avLst/>
           </a:prstGeom>
-          <a:solidFill>
-            <a:schemeClr val="tx1">
-              <a:lumMod val="50000"/>
-              <a:lumOff val="50000"/>
-            </a:schemeClr>
-          </a:solidFill>
+          <a:noFill/>
+          <a:ln>
+            <a:noFill/>
+          </a:ln>
         </p:spPr>
         <p:style>
           <a:lnRef idx="2">
@@ -6879,13 +6913,209 @@
           <a:p>
             <a:pPr algn="ctr"/>
             <a:r>
+              <a:rPr lang="en-US" dirty="0" smtClean="0">
+                <a:solidFill>
+                  <a:schemeClr val="tx1"/>
+                </a:solidFill>
+              </a:rPr>
+              <a:t>Network </a:t>
+            </a:r>
+            <a:r>
+              <a:rPr lang="en-US" dirty="0" smtClean="0">
+                <a:solidFill>
+                  <a:schemeClr val="tx1"/>
+                </a:solidFill>
+              </a:rPr>
+              <a:t>characteristics</a:t>
+            </a:r>
+            <a:endParaRPr lang="en-US" dirty="0">
+              <a:solidFill>
+                <a:schemeClr val="tx1"/>
+              </a:solidFill>
+            </a:endParaRPr>
+          </a:p>
+        </p:txBody>
+      </p:sp>
+      <p:sp>
+        <p:nvSpPr>
+          <p:cNvPr id="13" name="Oval 12"/>
+          <p:cNvSpPr/>
+          <p:nvPr/>
+        </p:nvSpPr>
+        <p:spPr>
+          <a:xfrm>
+            <a:off x="2228850" y="2286000"/>
+            <a:ext cx="971550" cy="609600"/>
+          </a:xfrm>
+          <a:prstGeom prst="ellipse">
+            <a:avLst/>
+          </a:prstGeom>
+          <a:solidFill>
+            <a:schemeClr val="tx1">
+              <a:lumMod val="50000"/>
+              <a:lumOff val="50000"/>
+            </a:schemeClr>
+          </a:solidFill>
+        </p:spPr>
+        <p:style>
+          <a:lnRef idx="2">
+            <a:schemeClr val="accent1">
+              <a:shade val="50000"/>
+            </a:schemeClr>
+          </a:lnRef>
+          <a:fillRef idx="1">
+            <a:schemeClr val="accent1"/>
+          </a:fillRef>
+          <a:effectRef idx="0">
+            <a:schemeClr val="accent1"/>
+          </a:effectRef>
+          <a:fontRef idx="minor">
+            <a:schemeClr val="lt1"/>
+          </a:fontRef>
+        </p:style>
+        <p:txBody>
+          <a:bodyPr rtlCol="0" anchor="ctr"/>
+          <a:lstStyle/>
+          <a:p>
+            <a:pPr algn="ctr"/>
+            <a:r>
               <a:rPr lang="en-US" dirty="0" smtClean="0"/>
-              <a:t>Network model</a:t>
+              <a:t>New rules</a:t>
             </a:r>
             <a:endParaRPr lang="en-US" dirty="0"/>
           </a:p>
         </p:txBody>
       </p:sp>
+      <p:sp>
+        <p:nvSpPr>
+          <p:cNvPr id="15" name="Oval 14"/>
+          <p:cNvSpPr/>
+          <p:nvPr/>
+        </p:nvSpPr>
+        <p:spPr>
+          <a:xfrm>
+            <a:off x="5201568" y="2286000"/>
+            <a:ext cx="1275432" cy="609600"/>
+          </a:xfrm>
+          <a:prstGeom prst="ellipse">
+            <a:avLst/>
+          </a:prstGeom>
+          <a:solidFill>
+            <a:schemeClr val="tx1">
+              <a:lumMod val="50000"/>
+              <a:lumOff val="50000"/>
+            </a:schemeClr>
+          </a:solidFill>
+        </p:spPr>
+        <p:style>
+          <a:lnRef idx="2">
+            <a:schemeClr val="accent1">
+              <a:shade val="50000"/>
+            </a:schemeClr>
+          </a:lnRef>
+          <a:fillRef idx="1">
+            <a:schemeClr val="accent1"/>
+          </a:fillRef>
+          <a:effectRef idx="0">
+            <a:schemeClr val="accent1"/>
+          </a:effectRef>
+          <a:fontRef idx="minor">
+            <a:schemeClr val="lt1"/>
+          </a:fontRef>
+        </p:style>
+        <p:txBody>
+          <a:bodyPr rtlCol="0" anchor="ctr"/>
+          <a:lstStyle/>
+          <a:p>
+            <a:pPr algn="ctr"/>
+            <a:r>
+              <a:rPr lang="en-US" dirty="0" smtClean="0"/>
+              <a:t>Update DAG</a:t>
+            </a:r>
+            <a:endParaRPr lang="en-US" dirty="0"/>
+          </a:p>
+        </p:txBody>
+      </p:sp>
+      <p:cxnSp>
+        <p:nvCxnSpPr>
+          <p:cNvPr id="17" name="Straight Arrow Connector 16"/>
+          <p:cNvCxnSpPr>
+            <a:stCxn id="5" idx="1"/>
+            <a:endCxn id="13" idx="6"/>
+          </p:cNvCxnSpPr>
+          <p:nvPr/>
+        </p:nvCxnSpPr>
+        <p:spPr>
+          <a:xfrm flipH="1">
+            <a:off x="3200400" y="2590800"/>
+            <a:ext cx="228600" cy="0"/>
+          </a:xfrm>
+          <a:prstGeom prst="straightConnector1">
+            <a:avLst/>
+          </a:prstGeom>
+          <a:ln w="38100">
+            <a:solidFill>
+              <a:schemeClr val="tx1"/>
+            </a:solidFill>
+            <a:headEnd type="triangle" w="med" len="med"/>
+            <a:tailEnd type="none" w="med" len="med"/>
+          </a:ln>
+        </p:spPr>
+        <p:style>
+          <a:lnRef idx="1">
+            <a:schemeClr val="accent1"/>
+          </a:lnRef>
+          <a:fillRef idx="0">
+            <a:schemeClr val="accent1"/>
+          </a:fillRef>
+          <a:effectRef idx="0">
+            <a:schemeClr val="accent1"/>
+          </a:effectRef>
+          <a:fontRef idx="minor">
+            <a:schemeClr val="tx1"/>
+          </a:fontRef>
+        </p:style>
+      </p:cxnSp>
+      <p:cxnSp>
+        <p:nvCxnSpPr>
+          <p:cNvPr id="21" name="Straight Arrow Connector 20"/>
+          <p:cNvCxnSpPr>
+            <a:stCxn id="10" idx="1"/>
+            <a:endCxn id="15" idx="6"/>
+          </p:cNvCxnSpPr>
+          <p:nvPr/>
+        </p:nvCxnSpPr>
+        <p:spPr>
+          <a:xfrm flipH="1">
+            <a:off x="6477000" y="2590800"/>
+            <a:ext cx="228600" cy="0"/>
+          </a:xfrm>
+          <a:prstGeom prst="straightConnector1">
+            <a:avLst/>
+          </a:prstGeom>
+          <a:ln w="38100">
+            <a:solidFill>
+              <a:schemeClr val="tx1"/>
+            </a:solidFill>
+            <a:headEnd type="triangle" w="med" len="med"/>
+            <a:tailEnd type="none" w="med" len="med"/>
+          </a:ln>
+        </p:spPr>
+        <p:style>
+          <a:lnRef idx="1">
+            <a:schemeClr val="accent1"/>
+          </a:lnRef>
+          <a:fillRef idx="0">
+            <a:schemeClr val="accent1"/>
+          </a:fillRef>
+          <a:effectRef idx="0">
+            <a:schemeClr val="accent1"/>
+          </a:effectRef>
+          <a:fontRef idx="minor">
+            <a:schemeClr val="tx1"/>
+          </a:fontRef>
+        </p:style>
+      </p:cxnSp>
     </p:spTree>
     <p:extLst>
       <p:ext uri="{BB962C8B-B14F-4D97-AF65-F5344CB8AC3E}">

</xml_diff>

<commit_message>
graph, plus some references, and lemmas
</commit_message>
<xml_diff>
--- a/figures/allfigures.pptx
+++ b/figures/allfigures.pptx
@@ -9,6 +9,7 @@
     <p:sldId id="257" r:id="rId3"/>
     <p:sldId id="258" r:id="rId4"/>
     <p:sldId id="260" r:id="rId5"/>
+    <p:sldId id="261" r:id="rId6"/>
   </p:sldIdLst>
   <p:sldSz cx="9144000" cy="6858000" type="screen4x3"/>
   <p:notesSz cx="6858000" cy="9144000"/>
@@ -109,7 +110,7 @@
   </p:defaultTextStyle>
   <p:extLst>
     <p:ext uri="{EFAFB233-063F-42B5-8137-9DF3F51BA10A}">
-      <p15:sldGuideLst xmlns:p15="http://schemas.microsoft.com/office/powerpoint/2012/main">
+      <p15:sldGuideLst xmlns:p15="http://schemas.microsoft.com/office/powerpoint/2012/main" xmlns="">
         <p15:guide id="1" orient="horz" pos="2160">
           <p15:clr>
             <a:srgbClr val="A4A3A4"/>
@@ -124,6 +125,816 @@
     </p:ext>
   </p:extLst>
 </p:presentation>
+</file>
+
+<file path=ppt/charts/chart1.xml><?xml version="1.0" encoding="utf-8"?>
+<c:chartSpace xmlns:c="http://schemas.openxmlformats.org/drawingml/2006/chart" xmlns:a="http://schemas.openxmlformats.org/drawingml/2006/main" xmlns:r="http://schemas.openxmlformats.org/officeDocument/2006/relationships">
+  <c:date1904 val="0"/>
+  <c:lang val="en-US"/>
+  <c:roundedCorners val="0"/>
+  <mc:AlternateContent xmlns:mc="http://schemas.openxmlformats.org/markup-compatibility/2006">
+    <mc:Choice xmlns:c14="http://schemas.microsoft.com/office/drawing/2007/8/2/chart" Requires="c14">
+      <c14:style val="101"/>
+    </mc:Choice>
+    <mc:Fallback>
+      <c:style val="1"/>
+    </mc:Fallback>
+  </mc:AlternateContent>
+  <c:chart>
+    <c:autoTitleDeleted val="1"/>
+    <c:plotArea>
+      <c:layout/>
+      <c:barChart>
+        <c:barDir val="col"/>
+        <c:grouping val="percentStacked"/>
+        <c:varyColors val="0"/>
+        <c:ser>
+          <c:idx val="0"/>
+          <c:order val="0"/>
+          <c:tx>
+            <c:strRef>
+              <c:f>'[new summary.xlsx]6461'!$Q$24</c:f>
+              <c:strCache>
+                <c:ptCount val="1"/>
+                <c:pt idx="0">
+                  <c:v>0</c:v>
+                </c:pt>
+              </c:strCache>
+            </c:strRef>
+          </c:tx>
+          <c:spPr>
+            <a:solidFill>
+              <a:schemeClr val="dk1">
+                <a:tint val="88500"/>
+              </a:schemeClr>
+            </a:solidFill>
+            <a:ln>
+              <a:noFill/>
+            </a:ln>
+            <a:effectLst/>
+          </c:spPr>
+          <c:invertIfNegative val="0"/>
+          <c:cat>
+            <c:numRef>
+              <c:f>'[new summary.xlsx]6461'!$R$23:$W$23</c:f>
+              <c:numCache>
+                <c:formatCode>General</c:formatCode>
+                <c:ptCount val="6"/>
+                <c:pt idx="0">
+                  <c:v>1221</c:v>
+                </c:pt>
+                <c:pt idx="1">
+                  <c:v>1239</c:v>
+                </c:pt>
+                <c:pt idx="2">
+                  <c:v>1755</c:v>
+                </c:pt>
+                <c:pt idx="3">
+                  <c:v>3257</c:v>
+                </c:pt>
+                <c:pt idx="4">
+                  <c:v>3967</c:v>
+                </c:pt>
+                <c:pt idx="5">
+                  <c:v>6461</c:v>
+                </c:pt>
+              </c:numCache>
+            </c:numRef>
+          </c:cat>
+          <c:val>
+            <c:numRef>
+              <c:f>'[new summary.xlsx]6461'!$R$24:$W$24</c:f>
+              <c:numCache>
+                <c:formatCode>General</c:formatCode>
+                <c:ptCount val="6"/>
+                <c:pt idx="0">
+                  <c:v>0.1787037037037037</c:v>
+                </c:pt>
+                <c:pt idx="1">
+                  <c:v>0.12130835185773262</c:v>
+                </c:pt>
+                <c:pt idx="2">
+                  <c:v>0.17701149425287357</c:v>
+                </c:pt>
+                <c:pt idx="3">
+                  <c:v>0.17515527950310558</c:v>
+                </c:pt>
+                <c:pt idx="4">
+                  <c:v>0.18227848101265823</c:v>
+                </c:pt>
+                <c:pt idx="5">
+                  <c:v>0.27304964539007093</c:v>
+                </c:pt>
+              </c:numCache>
+            </c:numRef>
+          </c:val>
+        </c:ser>
+        <c:ser>
+          <c:idx val="1"/>
+          <c:order val="1"/>
+          <c:tx>
+            <c:strRef>
+              <c:f>'[new summary.xlsx]6461'!$Q$25</c:f>
+              <c:strCache>
+                <c:ptCount val="1"/>
+                <c:pt idx="0">
+                  <c:v>1</c:v>
+                </c:pt>
+              </c:strCache>
+            </c:strRef>
+          </c:tx>
+          <c:spPr>
+            <a:solidFill>
+              <a:schemeClr val="dk1">
+                <a:tint val="55000"/>
+              </a:schemeClr>
+            </a:solidFill>
+            <a:ln>
+              <a:noFill/>
+            </a:ln>
+            <a:effectLst/>
+          </c:spPr>
+          <c:invertIfNegative val="0"/>
+          <c:cat>
+            <c:numRef>
+              <c:f>'[new summary.xlsx]6461'!$R$23:$W$23</c:f>
+              <c:numCache>
+                <c:formatCode>General</c:formatCode>
+                <c:ptCount val="6"/>
+                <c:pt idx="0">
+                  <c:v>1221</c:v>
+                </c:pt>
+                <c:pt idx="1">
+                  <c:v>1239</c:v>
+                </c:pt>
+                <c:pt idx="2">
+                  <c:v>1755</c:v>
+                </c:pt>
+                <c:pt idx="3">
+                  <c:v>3257</c:v>
+                </c:pt>
+                <c:pt idx="4">
+                  <c:v>3967</c:v>
+                </c:pt>
+                <c:pt idx="5">
+                  <c:v>6461</c:v>
+                </c:pt>
+              </c:numCache>
+            </c:numRef>
+          </c:cat>
+          <c:val>
+            <c:numRef>
+              <c:f>'[new summary.xlsx]6461'!$R$25:$W$25</c:f>
+              <c:numCache>
+                <c:formatCode>General</c:formatCode>
+                <c:ptCount val="6"/>
+                <c:pt idx="0">
+                  <c:v>0.29629629629629628</c:v>
+                </c:pt>
+                <c:pt idx="1">
+                  <c:v>0.39663385201651319</c:v>
+                </c:pt>
+                <c:pt idx="2">
+                  <c:v>0.29310344827586204</c:v>
+                </c:pt>
+                <c:pt idx="3">
+                  <c:v>0.33726708074534162</c:v>
+                </c:pt>
+                <c:pt idx="4">
+                  <c:v>0.25316455696202533</c:v>
+                </c:pt>
+                <c:pt idx="5">
+                  <c:v>0.2397163120567376</c:v>
+                </c:pt>
+              </c:numCache>
+            </c:numRef>
+          </c:val>
+        </c:ser>
+        <c:ser>
+          <c:idx val="2"/>
+          <c:order val="2"/>
+          <c:tx>
+            <c:strRef>
+              <c:f>'[new summary.xlsx]6461'!$Q$26</c:f>
+              <c:strCache>
+                <c:ptCount val="1"/>
+                <c:pt idx="0">
+                  <c:v>2</c:v>
+                </c:pt>
+              </c:strCache>
+            </c:strRef>
+          </c:tx>
+          <c:spPr>
+            <a:solidFill>
+              <a:schemeClr val="dk1">
+                <a:tint val="75000"/>
+              </a:schemeClr>
+            </a:solidFill>
+            <a:ln>
+              <a:noFill/>
+            </a:ln>
+            <a:effectLst/>
+          </c:spPr>
+          <c:invertIfNegative val="0"/>
+          <c:cat>
+            <c:numRef>
+              <c:f>'[new summary.xlsx]6461'!$R$23:$W$23</c:f>
+              <c:numCache>
+                <c:formatCode>General</c:formatCode>
+                <c:ptCount val="6"/>
+                <c:pt idx="0">
+                  <c:v>1221</c:v>
+                </c:pt>
+                <c:pt idx="1">
+                  <c:v>1239</c:v>
+                </c:pt>
+                <c:pt idx="2">
+                  <c:v>1755</c:v>
+                </c:pt>
+                <c:pt idx="3">
+                  <c:v>3257</c:v>
+                </c:pt>
+                <c:pt idx="4">
+                  <c:v>3967</c:v>
+                </c:pt>
+                <c:pt idx="5">
+                  <c:v>6461</c:v>
+                </c:pt>
+              </c:numCache>
+            </c:numRef>
+          </c:cat>
+          <c:val>
+            <c:numRef>
+              <c:f>'[new summary.xlsx]6461'!$R$26:$W$26</c:f>
+              <c:numCache>
+                <c:formatCode>General</c:formatCode>
+                <c:ptCount val="6"/>
+                <c:pt idx="0">
+                  <c:v>0.2898148148148148</c:v>
+                </c:pt>
+                <c:pt idx="1">
+                  <c:v>0.31311527469037792</c:v>
+                </c:pt>
+                <c:pt idx="2">
+                  <c:v>0.28620689655172415</c:v>
+                </c:pt>
+                <c:pt idx="3">
+                  <c:v>0.29130434782608694</c:v>
+                </c:pt>
+                <c:pt idx="4">
+                  <c:v>0.26962025316455696</c:v>
+                </c:pt>
+                <c:pt idx="5">
+                  <c:v>0.30709219858156028</c:v>
+                </c:pt>
+              </c:numCache>
+            </c:numRef>
+          </c:val>
+        </c:ser>
+        <c:ser>
+          <c:idx val="3"/>
+          <c:order val="3"/>
+          <c:tx>
+            <c:strRef>
+              <c:f>'[new summary.xlsx]6461'!$Q$27</c:f>
+              <c:strCache>
+                <c:ptCount val="1"/>
+                <c:pt idx="0">
+                  <c:v>3</c:v>
+                </c:pt>
+              </c:strCache>
+            </c:strRef>
+          </c:tx>
+          <c:spPr>
+            <a:solidFill>
+              <a:schemeClr val="dk1">
+                <a:tint val="98500"/>
+              </a:schemeClr>
+            </a:solidFill>
+            <a:ln>
+              <a:noFill/>
+            </a:ln>
+            <a:effectLst/>
+          </c:spPr>
+          <c:invertIfNegative val="0"/>
+          <c:cat>
+            <c:numRef>
+              <c:f>'[new summary.xlsx]6461'!$R$23:$W$23</c:f>
+              <c:numCache>
+                <c:formatCode>General</c:formatCode>
+                <c:ptCount val="6"/>
+                <c:pt idx="0">
+                  <c:v>1221</c:v>
+                </c:pt>
+                <c:pt idx="1">
+                  <c:v>1239</c:v>
+                </c:pt>
+                <c:pt idx="2">
+                  <c:v>1755</c:v>
+                </c:pt>
+                <c:pt idx="3">
+                  <c:v>3257</c:v>
+                </c:pt>
+                <c:pt idx="4">
+                  <c:v>3967</c:v>
+                </c:pt>
+                <c:pt idx="5">
+                  <c:v>6461</c:v>
+                </c:pt>
+              </c:numCache>
+            </c:numRef>
+          </c:cat>
+          <c:val>
+            <c:numRef>
+              <c:f>'[new summary.xlsx]6461'!$R$27:$W$27</c:f>
+              <c:numCache>
+                <c:formatCode>General</c:formatCode>
+                <c:ptCount val="6"/>
+                <c:pt idx="0">
+                  <c:v>0.15555555555555556</c:v>
+                </c:pt>
+                <c:pt idx="1">
+                  <c:v>0.12575420768497936</c:v>
+                </c:pt>
+                <c:pt idx="2">
+                  <c:v>0.16206896551724137</c:v>
+                </c:pt>
+                <c:pt idx="3">
+                  <c:v>0.1515527950310559</c:v>
+                </c:pt>
+                <c:pt idx="4">
+                  <c:v>0.19873417721518988</c:v>
+                </c:pt>
+                <c:pt idx="5">
+                  <c:v>0.12624113475177304</c:v>
+                </c:pt>
+              </c:numCache>
+            </c:numRef>
+          </c:val>
+        </c:ser>
+        <c:ser>
+          <c:idx val="4"/>
+          <c:order val="4"/>
+          <c:tx>
+            <c:strRef>
+              <c:f>'[new summary.xlsx]6461'!$Q$28</c:f>
+              <c:strCache>
+                <c:ptCount val="1"/>
+                <c:pt idx="0">
+                  <c:v>4</c:v>
+                </c:pt>
+              </c:strCache>
+            </c:strRef>
+          </c:tx>
+          <c:spPr>
+            <a:solidFill>
+              <a:schemeClr val="dk1">
+                <a:tint val="30000"/>
+              </a:schemeClr>
+            </a:solidFill>
+            <a:ln>
+              <a:noFill/>
+            </a:ln>
+            <a:effectLst/>
+          </c:spPr>
+          <c:invertIfNegative val="0"/>
+          <c:cat>
+            <c:numRef>
+              <c:f>'[new summary.xlsx]6461'!$R$23:$W$23</c:f>
+              <c:numCache>
+                <c:formatCode>General</c:formatCode>
+                <c:ptCount val="6"/>
+                <c:pt idx="0">
+                  <c:v>1221</c:v>
+                </c:pt>
+                <c:pt idx="1">
+                  <c:v>1239</c:v>
+                </c:pt>
+                <c:pt idx="2">
+                  <c:v>1755</c:v>
+                </c:pt>
+                <c:pt idx="3">
+                  <c:v>3257</c:v>
+                </c:pt>
+                <c:pt idx="4">
+                  <c:v>3967</c:v>
+                </c:pt>
+                <c:pt idx="5">
+                  <c:v>6461</c:v>
+                </c:pt>
+              </c:numCache>
+            </c:numRef>
+          </c:cat>
+          <c:val>
+            <c:numRef>
+              <c:f>'[new summary.xlsx]6461'!$R$28:$W$28</c:f>
+              <c:numCache>
+                <c:formatCode>General</c:formatCode>
+                <c:ptCount val="6"/>
+                <c:pt idx="0">
+                  <c:v>7.4999999999999997E-2</c:v>
+                </c:pt>
+                <c:pt idx="1">
+                  <c:v>3.3343918704350585E-2</c:v>
+                </c:pt>
+                <c:pt idx="2">
+                  <c:v>5.7471264367816091E-2</c:v>
+                </c:pt>
+                <c:pt idx="3">
+                  <c:v>3.9130434782608699E-2</c:v>
+                </c:pt>
+                <c:pt idx="4">
+                  <c:v>7.9746835443037969E-2</c:v>
+                </c:pt>
+                <c:pt idx="5">
+                  <c:v>3.8297872340425532E-2</c:v>
+                </c:pt>
+              </c:numCache>
+            </c:numRef>
+          </c:val>
+        </c:ser>
+        <c:ser>
+          <c:idx val="5"/>
+          <c:order val="5"/>
+          <c:tx>
+            <c:strRef>
+              <c:f>'[new summary.xlsx]6461'!$Q$29</c:f>
+              <c:strCache>
+                <c:ptCount val="1"/>
+                <c:pt idx="0">
+                  <c:v>5</c:v>
+                </c:pt>
+              </c:strCache>
+            </c:strRef>
+          </c:tx>
+          <c:spPr>
+            <a:solidFill>
+              <a:schemeClr val="dk1">
+                <a:tint val="60000"/>
+              </a:schemeClr>
+            </a:solidFill>
+            <a:ln>
+              <a:noFill/>
+            </a:ln>
+            <a:effectLst/>
+          </c:spPr>
+          <c:invertIfNegative val="0"/>
+          <c:cat>
+            <c:numRef>
+              <c:f>'[new summary.xlsx]6461'!$R$23:$W$23</c:f>
+              <c:numCache>
+                <c:formatCode>General</c:formatCode>
+                <c:ptCount val="6"/>
+                <c:pt idx="0">
+                  <c:v>1221</c:v>
+                </c:pt>
+                <c:pt idx="1">
+                  <c:v>1239</c:v>
+                </c:pt>
+                <c:pt idx="2">
+                  <c:v>1755</c:v>
+                </c:pt>
+                <c:pt idx="3">
+                  <c:v>3257</c:v>
+                </c:pt>
+                <c:pt idx="4">
+                  <c:v>3967</c:v>
+                </c:pt>
+                <c:pt idx="5">
+                  <c:v>6461</c:v>
+                </c:pt>
+              </c:numCache>
+            </c:numRef>
+          </c:cat>
+          <c:val>
+            <c:numRef>
+              <c:f>'[new summary.xlsx]6461'!$R$29:$W$29</c:f>
+              <c:numCache>
+                <c:formatCode>General</c:formatCode>
+                <c:ptCount val="6"/>
+                <c:pt idx="0">
+                  <c:v>4.6296296296296294E-3</c:v>
+                </c:pt>
+                <c:pt idx="1">
+                  <c:v>8.2565893934582399E-3</c:v>
+                </c:pt>
+                <c:pt idx="2">
+                  <c:v>1.8390804597701149E-2</c:v>
+                </c:pt>
+                <c:pt idx="3">
+                  <c:v>5.5900621118012426E-3</c:v>
+                </c:pt>
+                <c:pt idx="4">
+                  <c:v>1.6455696202531647E-2</c:v>
+                </c:pt>
+                <c:pt idx="5">
+                  <c:v>1.5602836879432624E-2</c:v>
+                </c:pt>
+              </c:numCache>
+            </c:numRef>
+          </c:val>
+        </c:ser>
+        <c:ser>
+          <c:idx val="6"/>
+          <c:order val="6"/>
+          <c:tx>
+            <c:strRef>
+              <c:f>'[new summary.xlsx]6461'!$Q$30</c:f>
+              <c:strCache>
+                <c:ptCount val="1"/>
+                <c:pt idx="0">
+                  <c:v>6</c:v>
+                </c:pt>
+              </c:strCache>
+            </c:strRef>
+          </c:tx>
+          <c:spPr>
+            <a:solidFill>
+              <a:schemeClr val="dk1">
+                <a:tint val="80000"/>
+              </a:schemeClr>
+            </a:solidFill>
+            <a:ln>
+              <a:noFill/>
+            </a:ln>
+            <a:effectLst/>
+          </c:spPr>
+          <c:invertIfNegative val="0"/>
+          <c:cat>
+            <c:numRef>
+              <c:f>'[new summary.xlsx]6461'!$R$23:$W$23</c:f>
+              <c:numCache>
+                <c:formatCode>General</c:formatCode>
+                <c:ptCount val="6"/>
+                <c:pt idx="0">
+                  <c:v>1221</c:v>
+                </c:pt>
+                <c:pt idx="1">
+                  <c:v>1239</c:v>
+                </c:pt>
+                <c:pt idx="2">
+                  <c:v>1755</c:v>
+                </c:pt>
+                <c:pt idx="3">
+                  <c:v>3257</c:v>
+                </c:pt>
+                <c:pt idx="4">
+                  <c:v>3967</c:v>
+                </c:pt>
+                <c:pt idx="5">
+                  <c:v>6461</c:v>
+                </c:pt>
+              </c:numCache>
+            </c:numRef>
+          </c:cat>
+          <c:val>
+            <c:numRef>
+              <c:f>'[new summary.xlsx]6461'!$R$30:$W$30</c:f>
+              <c:numCache>
+                <c:formatCode>General</c:formatCode>
+                <c:ptCount val="6"/>
+                <c:pt idx="0">
+                  <c:v>0</c:v>
+                </c:pt>
+                <c:pt idx="1">
+                  <c:v>1.5878056525881232E-3</c:v>
+                </c:pt>
+                <c:pt idx="2">
+                  <c:v>5.7471264367816091E-3</c:v>
+                </c:pt>
+                <c:pt idx="3">
+                  <c:v>0</c:v>
+                </c:pt>
+                <c:pt idx="4">
+                  <c:v>0</c:v>
+                </c:pt>
+                <c:pt idx="5">
+                  <c:v>0</c:v>
+                </c:pt>
+              </c:numCache>
+            </c:numRef>
+          </c:val>
+        </c:ser>
+        <c:ser>
+          <c:idx val="7"/>
+          <c:order val="7"/>
+          <c:tx>
+            <c:strRef>
+              <c:f>'[new summary.xlsx]6461'!$Q$31</c:f>
+              <c:strCache>
+                <c:ptCount val="1"/>
+                <c:pt idx="0">
+                  <c:v>7</c:v>
+                </c:pt>
+              </c:strCache>
+            </c:strRef>
+          </c:tx>
+          <c:spPr>
+            <a:solidFill>
+              <a:schemeClr val="dk1">
+                <a:tint val="88500"/>
+              </a:schemeClr>
+            </a:solidFill>
+            <a:ln>
+              <a:noFill/>
+            </a:ln>
+            <a:effectLst/>
+          </c:spPr>
+          <c:invertIfNegative val="0"/>
+          <c:cat>
+            <c:numRef>
+              <c:f>'[new summary.xlsx]6461'!$R$23:$W$23</c:f>
+              <c:numCache>
+                <c:formatCode>General</c:formatCode>
+                <c:ptCount val="6"/>
+                <c:pt idx="0">
+                  <c:v>1221</c:v>
+                </c:pt>
+                <c:pt idx="1">
+                  <c:v>1239</c:v>
+                </c:pt>
+                <c:pt idx="2">
+                  <c:v>1755</c:v>
+                </c:pt>
+                <c:pt idx="3">
+                  <c:v>3257</c:v>
+                </c:pt>
+                <c:pt idx="4">
+                  <c:v>3967</c:v>
+                </c:pt>
+                <c:pt idx="5">
+                  <c:v>6461</c:v>
+                </c:pt>
+              </c:numCache>
+            </c:numRef>
+          </c:cat>
+          <c:val>
+            <c:numRef>
+              <c:f>'[new summary.xlsx]6461'!$R$31:$W$31</c:f>
+              <c:numCache>
+                <c:formatCode>General</c:formatCode>
+                <c:ptCount val="6"/>
+                <c:pt idx="0">
+                  <c:v>0</c:v>
+                </c:pt>
+                <c:pt idx="1">
+                  <c:v>3.1756113051762465E-4</c:v>
+                </c:pt>
+                <c:pt idx="2">
+                  <c:v>0</c:v>
+                </c:pt>
+                <c:pt idx="3">
+                  <c:v>0</c:v>
+                </c:pt>
+                <c:pt idx="4">
+                  <c:v>0</c:v>
+                </c:pt>
+                <c:pt idx="5">
+                  <c:v>0</c:v>
+                </c:pt>
+              </c:numCache>
+            </c:numRef>
+          </c:val>
+        </c:ser>
+        <c:dLbls>
+          <c:showLegendKey val="0"/>
+          <c:showVal val="0"/>
+          <c:showCatName val="0"/>
+          <c:showSerName val="0"/>
+          <c:showPercent val="0"/>
+          <c:showBubbleSize val="0"/>
+        </c:dLbls>
+        <c:gapWidth val="150"/>
+        <c:overlap val="100"/>
+        <c:axId val="55878400"/>
+        <c:axId val="55879936"/>
+      </c:barChart>
+      <c:catAx>
+        <c:axId val="55878400"/>
+        <c:scaling>
+          <c:orientation val="minMax"/>
+        </c:scaling>
+        <c:delete val="0"/>
+        <c:axPos val="b"/>
+        <c:numFmt formatCode="General" sourceLinked="1"/>
+        <c:majorTickMark val="none"/>
+        <c:minorTickMark val="none"/>
+        <c:tickLblPos val="nextTo"/>
+        <c:spPr>
+          <a:noFill/>
+          <a:ln>
+            <a:noFill/>
+          </a:ln>
+          <a:effectLst/>
+        </c:spPr>
+        <c:txPr>
+          <a:bodyPr rot="-60000000" vert="horz"/>
+          <a:lstStyle/>
+          <a:p>
+            <a:pPr>
+              <a:defRPr/>
+            </a:pPr>
+            <a:endParaRPr lang="en-US"/>
+          </a:p>
+        </c:txPr>
+        <c:crossAx val="55879936"/>
+        <c:crosses val="autoZero"/>
+        <c:auto val="1"/>
+        <c:lblAlgn val="ctr"/>
+        <c:lblOffset val="100"/>
+        <c:noMultiLvlLbl val="0"/>
+      </c:catAx>
+      <c:valAx>
+        <c:axId val="55879936"/>
+        <c:scaling>
+          <c:orientation val="minMax"/>
+          <c:max val="1"/>
+        </c:scaling>
+        <c:delete val="0"/>
+        <c:axPos val="l"/>
+        <c:majorGridlines>
+          <c:spPr>
+            <a:ln w="9525" cap="flat" cmpd="sng" algn="ctr">
+              <a:solidFill>
+                <a:schemeClr val="tx1">
+                  <a:lumMod val="15000"/>
+                  <a:lumOff val="85000"/>
+                </a:schemeClr>
+              </a:solidFill>
+              <a:round/>
+            </a:ln>
+            <a:effectLst/>
+          </c:spPr>
+        </c:majorGridlines>
+        <c:numFmt formatCode="0%" sourceLinked="1"/>
+        <c:majorTickMark val="none"/>
+        <c:minorTickMark val="none"/>
+        <c:tickLblPos val="nextTo"/>
+        <c:spPr>
+          <a:noFill/>
+          <a:ln>
+            <a:noFill/>
+          </a:ln>
+          <a:effectLst/>
+        </c:spPr>
+        <c:txPr>
+          <a:bodyPr rot="-60000000" vert="horz"/>
+          <a:lstStyle/>
+          <a:p>
+            <a:pPr>
+              <a:defRPr/>
+            </a:pPr>
+            <a:endParaRPr lang="en-US"/>
+          </a:p>
+        </c:txPr>
+        <c:crossAx val="55878400"/>
+        <c:crosses val="autoZero"/>
+        <c:crossBetween val="between"/>
+      </c:valAx>
+    </c:plotArea>
+    <c:legend>
+      <c:legendPos val="b"/>
+      <c:layout/>
+      <c:overlay val="0"/>
+      <c:spPr>
+        <a:noFill/>
+        <a:ln>
+          <a:noFill/>
+        </a:ln>
+        <a:effectLst/>
+      </c:spPr>
+      <c:txPr>
+        <a:bodyPr rot="0" vert="horz"/>
+        <a:lstStyle/>
+        <a:p>
+          <a:pPr>
+            <a:defRPr/>
+          </a:pPr>
+          <a:endParaRPr lang="en-US"/>
+        </a:p>
+      </c:txPr>
+    </c:legend>
+    <c:plotVisOnly val="1"/>
+    <c:dispBlanksAs val="gap"/>
+    <c:showDLblsOverMax val="0"/>
+  </c:chart>
+  <c:txPr>
+    <a:bodyPr/>
+    <a:lstStyle/>
+    <a:p>
+      <a:pPr>
+        <a:defRPr sz="1800">
+          <a:latin typeface="Times New Roman" pitchFamily="18" charset="0"/>
+          <a:cs typeface="Times New Roman" pitchFamily="18" charset="0"/>
+        </a:defRPr>
+      </a:pPr>
+      <a:endParaRPr lang="en-US"/>
+    </a:p>
+  </c:txPr>
+  <c:externalData r:id="rId1">
+    <c:autoUpdate val="0"/>
+  </c:externalData>
+</c:chartSpace>
 </file>
 
 <file path=ppt/slideLayouts/slideLayout1.xml><?xml version="1.0" encoding="utf-8"?>
@@ -6406,6 +7217,8 @@
                 <a:solidFill>
                   <a:schemeClr val="tx1"/>
                 </a:solidFill>
+                <a:latin typeface="Times New Roman" pitchFamily="18" charset="0"/>
+                <a:cs typeface="Times New Roman" pitchFamily="18" charset="0"/>
               </a:rPr>
               <a:t>R</a:t>
             </a:r>
@@ -6414,6 +7227,8 @@
                 <a:solidFill>
                   <a:schemeClr val="tx1"/>
                 </a:solidFill>
+                <a:latin typeface="Times New Roman" pitchFamily="18" charset="0"/>
+                <a:cs typeface="Times New Roman" pitchFamily="18" charset="0"/>
               </a:rPr>
               <a:t>ule generator</a:t>
             </a:r>
@@ -6421,6 +7236,8 @@
               <a:solidFill>
                 <a:schemeClr val="tx1"/>
               </a:solidFill>
+              <a:latin typeface="Times New Roman" pitchFamily="18" charset="0"/>
+              <a:cs typeface="Times New Roman" pitchFamily="18" charset="0"/>
             </a:endParaRPr>
           </a:p>
         </p:txBody>
@@ -6472,21 +7289,17 @@
                 <a:solidFill>
                   <a:schemeClr val="tx1"/>
                 </a:solidFill>
+                <a:latin typeface="Times New Roman" pitchFamily="18" charset="0"/>
+                <a:cs typeface="Times New Roman" pitchFamily="18" charset="0"/>
               </a:rPr>
-              <a:t>Update </a:t>
-            </a:r>
-            <a:r>
-              <a:rPr lang="en-US" dirty="0" smtClean="0">
-                <a:solidFill>
-                  <a:schemeClr val="tx1"/>
-                </a:solidFill>
-              </a:rPr>
-              <a:t>plan generator</a:t>
+              <a:t>Update plan generator</a:t>
             </a:r>
             <a:endParaRPr lang="en-US" dirty="0">
               <a:solidFill>
                 <a:schemeClr val="tx1"/>
               </a:solidFill>
+              <a:latin typeface="Times New Roman" pitchFamily="18" charset="0"/>
+              <a:cs typeface="Times New Roman" pitchFamily="18" charset="0"/>
             </a:endParaRPr>
           </a:p>
         </p:txBody>
@@ -6616,6 +7429,8 @@
                 <a:solidFill>
                   <a:schemeClr val="tx1"/>
                 </a:solidFill>
+                <a:latin typeface="Times New Roman" pitchFamily="18" charset="0"/>
+                <a:cs typeface="Times New Roman" pitchFamily="18" charset="0"/>
               </a:rPr>
               <a:t>Plan optimizer</a:t>
             </a:r>
@@ -6624,6 +7439,8 @@
                 <a:solidFill>
                   <a:schemeClr val="tx1"/>
                 </a:solidFill>
+                <a:latin typeface="Times New Roman" pitchFamily="18" charset="0"/>
+                <a:cs typeface="Times New Roman" pitchFamily="18" charset="0"/>
               </a:rPr>
               <a:t> </a:t>
             </a:r>
@@ -6632,6 +7449,8 @@
                 <a:solidFill>
                   <a:schemeClr val="tx1"/>
                 </a:solidFill>
+                <a:latin typeface="Times New Roman" pitchFamily="18" charset="0"/>
+                <a:cs typeface="Times New Roman" pitchFamily="18" charset="0"/>
               </a:rPr>
               <a:t>and  executor</a:t>
             </a:r>
@@ -6639,6 +7458,8 @@
               <a:solidFill>
                 <a:schemeClr val="tx1"/>
               </a:solidFill>
+              <a:latin typeface="Times New Roman" pitchFamily="18" charset="0"/>
+              <a:cs typeface="Times New Roman" pitchFamily="18" charset="0"/>
             </a:endParaRPr>
           </a:p>
         </p:txBody>
@@ -6654,8 +7475,8 @@
         </p:nvCxnSpPr>
         <p:spPr>
           <a:xfrm>
-            <a:off x="1257300" y="1981200"/>
-            <a:ext cx="38100" cy="304800"/>
+            <a:off x="1295400" y="1981200"/>
+            <a:ext cx="0" cy="304800"/>
           </a:xfrm>
           <a:prstGeom prst="straightConnector1">
             <a:avLst/>
@@ -6693,8 +7514,8 @@
         </p:nvCxnSpPr>
         <p:spPr>
           <a:xfrm>
-            <a:off x="4171950" y="1981200"/>
-            <a:ext cx="19050" cy="304800"/>
+            <a:off x="4191000" y="1981200"/>
+            <a:ext cx="0" cy="304800"/>
           </a:xfrm>
           <a:prstGeom prst="straightConnector1">
             <a:avLst/>
@@ -6731,9 +7552,9 @@
           <p:nvPr/>
         </p:nvCxnSpPr>
         <p:spPr>
-          <a:xfrm flipH="1">
+          <a:xfrm>
             <a:off x="7467600" y="1981200"/>
-            <a:ext cx="38100" cy="304800"/>
+            <a:ext cx="0" cy="304800"/>
           </a:xfrm>
           <a:prstGeom prst="straightConnector1">
             <a:avLst/>
@@ -6768,7 +7589,7 @@
         </p:nvSpPr>
         <p:spPr>
           <a:xfrm>
-            <a:off x="533400" y="1371600"/>
+            <a:off x="571500" y="1371600"/>
             <a:ext cx="1447800" cy="609600"/>
           </a:xfrm>
           <a:prstGeom prst="ellipse">
@@ -6805,6 +7626,8 @@
                 <a:solidFill>
                   <a:schemeClr val="tx1"/>
                 </a:solidFill>
+                <a:latin typeface="Times New Roman" pitchFamily="18" charset="0"/>
+                <a:cs typeface="Times New Roman" pitchFamily="18" charset="0"/>
               </a:rPr>
               <a:t>Routing policy</a:t>
             </a:r>
@@ -6812,6 +7635,8 @@
               <a:solidFill>
                 <a:schemeClr val="tx1"/>
               </a:solidFill>
+              <a:latin typeface="Times New Roman" pitchFamily="18" charset="0"/>
+              <a:cs typeface="Times New Roman" pitchFamily="18" charset="0"/>
             </a:endParaRPr>
           </a:p>
         </p:txBody>
@@ -6824,7 +7649,7 @@
         </p:nvSpPr>
         <p:spPr>
           <a:xfrm>
-            <a:off x="3238500" y="1371600"/>
+            <a:off x="3257550" y="1371600"/>
             <a:ext cx="1866900" cy="609600"/>
           </a:xfrm>
           <a:prstGeom prst="ellipse">
@@ -6861,6 +7686,8 @@
                 <a:solidFill>
                   <a:schemeClr val="tx1"/>
                 </a:solidFill>
+                <a:latin typeface="Times New Roman" pitchFamily="18" charset="0"/>
+                <a:cs typeface="Times New Roman" pitchFamily="18" charset="0"/>
               </a:rPr>
               <a:t>Consistency property</a:t>
             </a:r>
@@ -6868,6 +7695,8 @@
               <a:solidFill>
                 <a:schemeClr val="tx1"/>
               </a:solidFill>
+              <a:latin typeface="Times New Roman" pitchFamily="18" charset="0"/>
+              <a:cs typeface="Times New Roman" pitchFamily="18" charset="0"/>
             </a:endParaRPr>
           </a:p>
         </p:txBody>
@@ -6880,7 +7709,7 @@
         </p:nvSpPr>
         <p:spPr>
           <a:xfrm>
-            <a:off x="6400800" y="1371600"/>
+            <a:off x="6362700" y="1371600"/>
             <a:ext cx="2209800" cy="609600"/>
           </a:xfrm>
           <a:prstGeom prst="ellipse">
@@ -6917,21 +7746,17 @@
                 <a:solidFill>
                   <a:schemeClr val="tx1"/>
                 </a:solidFill>
+                <a:latin typeface="Times New Roman" pitchFamily="18" charset="0"/>
+                <a:cs typeface="Times New Roman" pitchFamily="18" charset="0"/>
               </a:rPr>
-              <a:t>Network </a:t>
-            </a:r>
-            <a:r>
-              <a:rPr lang="en-US" dirty="0" smtClean="0">
-                <a:solidFill>
-                  <a:schemeClr val="tx1"/>
-                </a:solidFill>
-              </a:rPr>
-              <a:t>characteristics</a:t>
+              <a:t>Network characteristics</a:t>
             </a:r>
             <a:endParaRPr lang="en-US" dirty="0">
               <a:solidFill>
                 <a:schemeClr val="tx1"/>
               </a:solidFill>
+              <a:latin typeface="Times New Roman" pitchFamily="18" charset="0"/>
+              <a:cs typeface="Times New Roman" pitchFamily="18" charset="0"/>
             </a:endParaRPr>
           </a:p>
         </p:txBody>
@@ -6979,10 +7804,16 @@
           <a:p>
             <a:pPr algn="ctr"/>
             <a:r>
-              <a:rPr lang="en-US" dirty="0" smtClean="0"/>
+              <a:rPr lang="en-US" dirty="0" smtClean="0">
+                <a:latin typeface="Times New Roman" pitchFamily="18" charset="0"/>
+                <a:cs typeface="Times New Roman" pitchFamily="18" charset="0"/>
+              </a:rPr>
               <a:t>New rules</a:t>
             </a:r>
-            <a:endParaRPr lang="en-US" dirty="0"/>
+            <a:endParaRPr lang="en-US" dirty="0">
+              <a:latin typeface="Times New Roman" pitchFamily="18" charset="0"/>
+              <a:cs typeface="Times New Roman" pitchFamily="18" charset="0"/>
+            </a:endParaRPr>
           </a:p>
         </p:txBody>
       </p:sp>
@@ -7029,10 +7860,16 @@
           <a:p>
             <a:pPr algn="ctr"/>
             <a:r>
-              <a:rPr lang="en-US" dirty="0" smtClean="0"/>
+              <a:rPr lang="en-US" dirty="0" smtClean="0">
+                <a:latin typeface="Times New Roman" pitchFamily="18" charset="0"/>
+                <a:cs typeface="Times New Roman" pitchFamily="18" charset="0"/>
+              </a:rPr>
               <a:t>Update DAG</a:t>
             </a:r>
-            <a:endParaRPr lang="en-US" dirty="0"/>
+            <a:endParaRPr lang="en-US" dirty="0">
+              <a:latin typeface="Times New Roman" pitchFamily="18" charset="0"/>
+              <a:cs typeface="Times New Roman" pitchFamily="18" charset="0"/>
+            </a:endParaRPr>
           </a:p>
         </p:txBody>
       </p:sp>
@@ -7116,10 +7953,128 @@
           </a:fontRef>
         </p:style>
       </p:cxnSp>
+      <p:pic>
+        <p:nvPicPr>
+          <p:cNvPr id="1026" name="Picture 2"/>
+          <p:cNvPicPr>
+            <a:picLocks noChangeAspect="1" noChangeArrowheads="1"/>
+          </p:cNvPicPr>
+          <p:nvPr/>
+        </p:nvPicPr>
+        <p:blipFill>
+          <a:blip r:embed="rId2">
+            <a:extLst>
+              <a:ext uri="{28A0092B-C50C-407E-A947-70E740481C1C}">
+                <a14:useLocalDpi xmlns:a14="http://schemas.microsoft.com/office/drawing/2010/main" val="0"/>
+              </a:ext>
+            </a:extLst>
+          </a:blip>
+          <a:srcRect/>
+          <a:stretch>
+            <a:fillRect/>
+          </a:stretch>
+        </p:blipFill>
+        <p:spPr bwMode="auto">
+          <a:xfrm>
+            <a:off x="457200" y="3810000"/>
+            <a:ext cx="7999413" cy="1676400"/>
+          </a:xfrm>
+          <a:prstGeom prst="rect">
+            <a:avLst/>
+          </a:prstGeom>
+          <a:noFill/>
+          <a:ln>
+            <a:noFill/>
+          </a:ln>
+          <a:effectLst/>
+          <a:extLst>
+            <a:ext uri="{909E8E84-426E-40DD-AFC4-6F175D3DCCD1}">
+              <a14:hiddenFill xmlns:a14="http://schemas.microsoft.com/office/drawing/2010/main">
+                <a:solidFill>
+                  <a:schemeClr val="accent1"/>
+                </a:solidFill>
+              </a14:hiddenFill>
+            </a:ext>
+            <a:ext uri="{91240B29-F687-4F45-9708-019B960494DF}">
+              <a14:hiddenLine xmlns:a14="http://schemas.microsoft.com/office/drawing/2010/main" w="9525">
+                <a:solidFill>
+                  <a:schemeClr val="tx1"/>
+                </a:solidFill>
+                <a:miter lim="800000"/>
+                <a:headEnd/>
+                <a:tailEnd/>
+              </a14:hiddenLine>
+            </a:ext>
+            <a:ext uri="{AF507438-7753-43E0-B8FC-AC1667EBCBE1}">
+              <a14:hiddenEffects xmlns:a14="http://schemas.microsoft.com/office/drawing/2010/main">
+                <a:effectLst>
+                  <a:outerShdw dist="35921" dir="2700000" algn="ctr" rotWithShape="0">
+                    <a:schemeClr val="bg2"/>
+                  </a:outerShdw>
+                </a:effectLst>
+              </a14:hiddenEffects>
+            </a:ext>
+          </a:extLst>
+        </p:spPr>
+      </p:pic>
     </p:spTree>
     <p:extLst>
       <p:ext uri="{BB962C8B-B14F-4D97-AF65-F5344CB8AC3E}">
         <p14:creationId xmlns:p14="http://schemas.microsoft.com/office/powerpoint/2010/main" val="1540731110"/>
+      </p:ext>
+    </p:extLst>
+  </p:cSld>
+  <p:clrMapOvr>
+    <a:masterClrMapping/>
+  </p:clrMapOvr>
+</p:sld>
+</file>
+
+<file path=ppt/slides/slide5.xml><?xml version="1.0" encoding="utf-8"?>
+<p:sld xmlns:a="http://schemas.openxmlformats.org/drawingml/2006/main" xmlns:r="http://schemas.openxmlformats.org/officeDocument/2006/relationships" xmlns:p="http://schemas.openxmlformats.org/presentationml/2006/main">
+  <p:cSld>
+    <p:spTree>
+      <p:nvGrpSpPr>
+        <p:cNvPr id="1" name=""/>
+        <p:cNvGrpSpPr/>
+        <p:nvPr/>
+      </p:nvGrpSpPr>
+      <p:grpSpPr>
+        <a:xfrm>
+          <a:off x="0" y="0"/>
+          <a:ext cx="0" cy="0"/>
+          <a:chOff x="0" y="0"/>
+          <a:chExt cx="0" cy="0"/>
+        </a:xfrm>
+      </p:grpSpPr>
+      <p:graphicFrame>
+        <p:nvGraphicFramePr>
+          <p:cNvPr id="2" name="Chart 1"/>
+          <p:cNvGraphicFramePr>
+            <a:graphicFrameLocks/>
+          </p:cNvGraphicFramePr>
+          <p:nvPr>
+            <p:extLst>
+              <p:ext uri="{D42A27DB-BD31-4B8C-83A1-F6EECF244321}">
+                <p14:modId xmlns:p14="http://schemas.microsoft.com/office/powerpoint/2010/main" val="4218057880"/>
+              </p:ext>
+            </p:extLst>
+          </p:nvPr>
+        </p:nvGraphicFramePr>
+        <p:xfrm>
+          <a:off x="1905000" y="1828801"/>
+          <a:ext cx="5257800" cy="3276599"/>
+        </p:xfrm>
+        <a:graphic>
+          <a:graphicData uri="http://schemas.openxmlformats.org/drawingml/2006/chart">
+            <c:chart xmlns:c="http://schemas.openxmlformats.org/drawingml/2006/chart" xmlns:r="http://schemas.openxmlformats.org/officeDocument/2006/relationships" r:id="rId2"/>
+          </a:graphicData>
+        </a:graphic>
+      </p:graphicFrame>
+    </p:spTree>
+    <p:extLst>
+      <p:ext uri="{BB962C8B-B14F-4D97-AF65-F5344CB8AC3E}">
+        <p14:creationId xmlns:p14="http://schemas.microsoft.com/office/powerpoint/2010/main" val="2458631411"/>
       </p:ext>
     </p:extLst>
   </p:cSld>

</xml_diff>